<commit_message>
UPD - business card add email
</commit_message>
<xml_diff>
--- a/rating_platform/copyright free pics/business card_yuan.pptx
+++ b/rating_platform/copyright free pics/business card_yuan.pptx
@@ -255,7 +255,7 @@
           <a:p>
             <a:fld id="{9FA97E3F-B827-4965-9615-DF6BC79425F2}" type="datetimeFigureOut">
               <a:rPr lang="zh-CN" altLang="en-US" smtClean="0"/>
-              <a:t>2017/4/13</a:t>
+              <a:t>2017/6/9</a:t>
             </a:fld>
             <a:endParaRPr lang="zh-CN" altLang="en-US"/>
           </a:p>
@@ -425,7 +425,7 @@
           <a:p>
             <a:fld id="{9FA97E3F-B827-4965-9615-DF6BC79425F2}" type="datetimeFigureOut">
               <a:rPr lang="zh-CN" altLang="en-US" smtClean="0"/>
-              <a:t>2017/4/13</a:t>
+              <a:t>2017/6/9</a:t>
             </a:fld>
             <a:endParaRPr lang="zh-CN" altLang="en-US"/>
           </a:p>
@@ -605,7 +605,7 @@
           <a:p>
             <a:fld id="{9FA97E3F-B827-4965-9615-DF6BC79425F2}" type="datetimeFigureOut">
               <a:rPr lang="zh-CN" altLang="en-US" smtClean="0"/>
-              <a:t>2017/4/13</a:t>
+              <a:t>2017/6/9</a:t>
             </a:fld>
             <a:endParaRPr lang="zh-CN" altLang="en-US"/>
           </a:p>
@@ -775,7 +775,7 @@
           <a:p>
             <a:fld id="{9FA97E3F-B827-4965-9615-DF6BC79425F2}" type="datetimeFigureOut">
               <a:rPr lang="zh-CN" altLang="en-US" smtClean="0"/>
-              <a:t>2017/4/13</a:t>
+              <a:t>2017/6/9</a:t>
             </a:fld>
             <a:endParaRPr lang="zh-CN" altLang="en-US"/>
           </a:p>
@@ -1021,7 +1021,7 @@
           <a:p>
             <a:fld id="{9FA97E3F-B827-4965-9615-DF6BC79425F2}" type="datetimeFigureOut">
               <a:rPr lang="zh-CN" altLang="en-US" smtClean="0"/>
-              <a:t>2017/4/13</a:t>
+              <a:t>2017/6/9</a:t>
             </a:fld>
             <a:endParaRPr lang="zh-CN" altLang="en-US"/>
           </a:p>
@@ -1253,7 +1253,7 @@
           <a:p>
             <a:fld id="{9FA97E3F-B827-4965-9615-DF6BC79425F2}" type="datetimeFigureOut">
               <a:rPr lang="zh-CN" altLang="en-US" smtClean="0"/>
-              <a:t>2017/4/13</a:t>
+              <a:t>2017/6/9</a:t>
             </a:fld>
             <a:endParaRPr lang="zh-CN" altLang="en-US"/>
           </a:p>
@@ -1620,7 +1620,7 @@
           <a:p>
             <a:fld id="{9FA97E3F-B827-4965-9615-DF6BC79425F2}" type="datetimeFigureOut">
               <a:rPr lang="zh-CN" altLang="en-US" smtClean="0"/>
-              <a:t>2017/4/13</a:t>
+              <a:t>2017/6/9</a:t>
             </a:fld>
             <a:endParaRPr lang="zh-CN" altLang="en-US"/>
           </a:p>
@@ -1738,7 +1738,7 @@
           <a:p>
             <a:fld id="{9FA97E3F-B827-4965-9615-DF6BC79425F2}" type="datetimeFigureOut">
               <a:rPr lang="zh-CN" altLang="en-US" smtClean="0"/>
-              <a:t>2017/4/13</a:t>
+              <a:t>2017/6/9</a:t>
             </a:fld>
             <a:endParaRPr lang="zh-CN" altLang="en-US"/>
           </a:p>
@@ -1833,7 +1833,7 @@
           <a:p>
             <a:fld id="{9FA97E3F-B827-4965-9615-DF6BC79425F2}" type="datetimeFigureOut">
               <a:rPr lang="zh-CN" altLang="en-US" smtClean="0"/>
-              <a:t>2017/4/13</a:t>
+              <a:t>2017/6/9</a:t>
             </a:fld>
             <a:endParaRPr lang="zh-CN" altLang="en-US"/>
           </a:p>
@@ -2110,7 +2110,7 @@
           <a:p>
             <a:fld id="{9FA97E3F-B827-4965-9615-DF6BC79425F2}" type="datetimeFigureOut">
               <a:rPr lang="zh-CN" altLang="en-US" smtClean="0"/>
-              <a:t>2017/4/13</a:t>
+              <a:t>2017/6/9</a:t>
             </a:fld>
             <a:endParaRPr lang="zh-CN" altLang="en-US"/>
           </a:p>
@@ -2367,7 +2367,7 @@
           <a:p>
             <a:fld id="{9FA97E3F-B827-4965-9615-DF6BC79425F2}" type="datetimeFigureOut">
               <a:rPr lang="zh-CN" altLang="en-US" smtClean="0"/>
-              <a:t>2017/4/13</a:t>
+              <a:t>2017/6/9</a:t>
             </a:fld>
             <a:endParaRPr lang="zh-CN" altLang="en-US"/>
           </a:p>
@@ -2580,7 +2580,7 @@
           <a:p>
             <a:fld id="{9FA97E3F-B827-4965-9615-DF6BC79425F2}" type="datetimeFigureOut">
               <a:rPr lang="zh-CN" altLang="en-US" smtClean="0"/>
-              <a:t>2017/4/13</a:t>
+              <a:t>2017/6/9</a:t>
             </a:fld>
             <a:endParaRPr lang="zh-CN" altLang="en-US"/>
           </a:p>
@@ -3226,8 +3226,8 @@
         </p:nvSpPr>
         <p:spPr>
           <a:xfrm>
-            <a:off x="16169070" y="15354071"/>
-            <a:ext cx="12825370" cy="823623"/>
+            <a:off x="14312078" y="14664782"/>
+            <a:ext cx="14213442" cy="1554913"/>
           </a:xfrm>
           <a:prstGeom prst="rect">
             <a:avLst/>
@@ -3239,6 +3239,37 @@
           </a:bodyPr>
           <a:lstStyle/>
           <a:p>
+            <a:pPr algn="r"/>
+            <a:r>
+              <a:rPr lang="en-US" altLang="zh-CN" dirty="0">
+                <a:solidFill>
+                  <a:schemeClr val="bg1">
+                    <a:lumMod val="65000"/>
+                  </a:schemeClr>
+                </a:solidFill>
+              </a:rPr>
+              <a:t>Any problems? Email us at </a:t>
+            </a:r>
+            <a:r>
+              <a:rPr lang="en-US" altLang="zh-CN" u="sng" dirty="0" smtClean="0">
+                <a:solidFill>
+                  <a:schemeClr val="bg1">
+                    <a:lumMod val="65000"/>
+                  </a:schemeClr>
+                </a:solidFill>
+              </a:rPr>
+              <a:t>umdcyclingsafety@gmail.com</a:t>
+            </a:r>
+            <a:endParaRPr lang="en-US" altLang="zh-CN" dirty="0" smtClean="0">
+              <a:solidFill>
+                <a:schemeClr val="bg1">
+                  <a:lumMod val="65000"/>
+                </a:schemeClr>
+              </a:solidFill>
+            </a:endParaRPr>
+          </a:p>
+          <a:p>
+            <a:pPr algn="r"/>
             <a:r>
               <a:rPr lang="en-US" altLang="zh-CN" dirty="0" smtClean="0">
                 <a:solidFill>
@@ -3247,7 +3278,27 @@
                   </a:schemeClr>
                 </a:solidFill>
               </a:rPr>
-              <a:t> Designed and lead by the </a:t>
+              <a:t> Designed and </a:t>
+            </a:r>
+            <a:r>
+              <a:rPr lang="en-US" altLang="zh-CN" dirty="0" smtClean="0">
+                <a:solidFill>
+                  <a:schemeClr val="bg1">
+                    <a:lumMod val="65000"/>
+                  </a:schemeClr>
+                </a:solidFill>
+              </a:rPr>
+              <a:t>led </a:t>
+            </a:r>
+            <a:r>
+              <a:rPr lang="en-US" altLang="zh-CN" dirty="0" smtClean="0">
+                <a:solidFill>
+                  <a:schemeClr val="bg1">
+                    <a:lumMod val="65000"/>
+                  </a:schemeClr>
+                </a:solidFill>
+              </a:rPr>
+              <a:t>by the </a:t>
             </a:r>
             <a:r>
               <a:rPr lang="en-US" altLang="zh-CN" u="sng" dirty="0" smtClean="0">
@@ -3279,6 +3330,13 @@
               </a:rPr>
               <a:t>at </a:t>
             </a:r>
+            <a:endParaRPr lang="en-US" altLang="zh-CN" dirty="0">
+              <a:solidFill>
+                <a:schemeClr val="bg1">
+                  <a:lumMod val="65000"/>
+                </a:schemeClr>
+              </a:solidFill>
+            </a:endParaRPr>
           </a:p>
         </p:txBody>
       </p:sp>

</xml_diff>